<commit_message>
Useable neurips version with new results
</commit_message>
<xml_diff>
--- a/plots_for_papers.pptx
+++ b/plots_for_papers.pptx
@@ -104,6 +104,11 @@
       </a:defRPr>
     </a:lvl9pPr>
   </p:defaultTextStyle>
+  <p:extLst>
+    <p:ext uri="{EFAFB233-063F-42B5-8137-9DF3F51BA10A}">
+      <p15:sldGuideLst xmlns:p15="http://schemas.microsoft.com/office/powerpoint/2012/main"/>
+    </p:ext>
+  </p:extLst>
 </p:presentation>
 </file>
 
@@ -256,7 +261,7 @@
           <a:p>
             <a:fld id="{F63EBC33-19C7-4A76-BC4C-95BEB4AA5ECD}" type="datetimeFigureOut">
               <a:rPr lang="en-IL" smtClean="0"/>
-              <a:t>22/03/2022</a:t>
+              <a:t>26/05/2022</a:t>
             </a:fld>
             <a:endParaRPr lang="en-IL"/>
           </a:p>
@@ -456,7 +461,7 @@
           <a:p>
             <a:fld id="{F63EBC33-19C7-4A76-BC4C-95BEB4AA5ECD}" type="datetimeFigureOut">
               <a:rPr lang="en-IL" smtClean="0"/>
-              <a:t>22/03/2022</a:t>
+              <a:t>26/05/2022</a:t>
             </a:fld>
             <a:endParaRPr lang="en-IL"/>
           </a:p>
@@ -666,7 +671,7 @@
           <a:p>
             <a:fld id="{F63EBC33-19C7-4A76-BC4C-95BEB4AA5ECD}" type="datetimeFigureOut">
               <a:rPr lang="en-IL" smtClean="0"/>
-              <a:t>22/03/2022</a:t>
+              <a:t>26/05/2022</a:t>
             </a:fld>
             <a:endParaRPr lang="en-IL"/>
           </a:p>
@@ -866,7 +871,7 @@
           <a:p>
             <a:fld id="{F63EBC33-19C7-4A76-BC4C-95BEB4AA5ECD}" type="datetimeFigureOut">
               <a:rPr lang="en-IL" smtClean="0"/>
-              <a:t>22/03/2022</a:t>
+              <a:t>26/05/2022</a:t>
             </a:fld>
             <a:endParaRPr lang="en-IL"/>
           </a:p>
@@ -1142,7 +1147,7 @@
           <a:p>
             <a:fld id="{F63EBC33-19C7-4A76-BC4C-95BEB4AA5ECD}" type="datetimeFigureOut">
               <a:rPr lang="en-IL" smtClean="0"/>
-              <a:t>22/03/2022</a:t>
+              <a:t>26/05/2022</a:t>
             </a:fld>
             <a:endParaRPr lang="en-IL"/>
           </a:p>
@@ -1410,7 +1415,7 @@
           <a:p>
             <a:fld id="{F63EBC33-19C7-4A76-BC4C-95BEB4AA5ECD}" type="datetimeFigureOut">
               <a:rPr lang="en-IL" smtClean="0"/>
-              <a:t>22/03/2022</a:t>
+              <a:t>26/05/2022</a:t>
             </a:fld>
             <a:endParaRPr lang="en-IL"/>
           </a:p>
@@ -1825,7 +1830,7 @@
           <a:p>
             <a:fld id="{F63EBC33-19C7-4A76-BC4C-95BEB4AA5ECD}" type="datetimeFigureOut">
               <a:rPr lang="en-IL" smtClean="0"/>
-              <a:t>22/03/2022</a:t>
+              <a:t>26/05/2022</a:t>
             </a:fld>
             <a:endParaRPr lang="en-IL"/>
           </a:p>
@@ -1967,7 +1972,7 @@
           <a:p>
             <a:fld id="{F63EBC33-19C7-4A76-BC4C-95BEB4AA5ECD}" type="datetimeFigureOut">
               <a:rPr lang="en-IL" smtClean="0"/>
-              <a:t>22/03/2022</a:t>
+              <a:t>26/05/2022</a:t>
             </a:fld>
             <a:endParaRPr lang="en-IL"/>
           </a:p>
@@ -2080,7 +2085,7 @@
           <a:p>
             <a:fld id="{F63EBC33-19C7-4A76-BC4C-95BEB4AA5ECD}" type="datetimeFigureOut">
               <a:rPr lang="en-IL" smtClean="0"/>
-              <a:t>22/03/2022</a:t>
+              <a:t>26/05/2022</a:t>
             </a:fld>
             <a:endParaRPr lang="en-IL"/>
           </a:p>
@@ -2393,7 +2398,7 @@
           <a:p>
             <a:fld id="{F63EBC33-19C7-4A76-BC4C-95BEB4AA5ECD}" type="datetimeFigureOut">
               <a:rPr lang="en-IL" smtClean="0"/>
-              <a:t>22/03/2022</a:t>
+              <a:t>26/05/2022</a:t>
             </a:fld>
             <a:endParaRPr lang="en-IL"/>
           </a:p>
@@ -2682,7 +2687,7 @@
           <a:p>
             <a:fld id="{F63EBC33-19C7-4A76-BC4C-95BEB4AA5ECD}" type="datetimeFigureOut">
               <a:rPr lang="en-IL" smtClean="0"/>
-              <a:t>22/03/2022</a:t>
+              <a:t>26/05/2022</a:t>
             </a:fld>
             <a:endParaRPr lang="en-IL"/>
           </a:p>
@@ -2925,7 +2930,7 @@
           <a:p>
             <a:fld id="{F63EBC33-19C7-4A76-BC4C-95BEB4AA5ECD}" type="datetimeFigureOut">
               <a:rPr lang="en-IL" smtClean="0"/>
-              <a:t>22/03/2022</a:t>
+              <a:t>26/05/2022</a:t>
             </a:fld>
             <a:endParaRPr lang="en-IL"/>
           </a:p>
@@ -3342,8 +3347,8 @@
           <a:chExt cx="0" cy="0"/>
         </a:xfrm>
       </p:grpSpPr>
-      <mc:AlternateContent xmlns:mc="http://schemas.openxmlformats.org/markup-compatibility/2006">
-        <mc:Choice xmlns:a14="http://schemas.microsoft.com/office/drawing/2010/main" Requires="a14">
+      <mc:AlternateContent xmlns:mc="http://schemas.openxmlformats.org/markup-compatibility/2006" xmlns:a14="http://schemas.microsoft.com/office/drawing/2010/main">
+        <mc:Choice Requires="a14">
           <p:sp>
             <p:nvSpPr>
               <p:cNvPr id="4" name="Rectangle 3">
@@ -3423,7 +3428,7 @@
             </p:txBody>
           </p:sp>
         </mc:Choice>
-        <mc:Fallback>
+        <mc:Fallback xmlns="">
           <p:sp>
             <p:nvSpPr>
               <p:cNvPr id="4" name="Rectangle 3">
@@ -3468,8 +3473,8 @@
           </p:sp>
         </mc:Fallback>
       </mc:AlternateContent>
-      <mc:AlternateContent xmlns:mc="http://schemas.openxmlformats.org/markup-compatibility/2006">
-        <mc:Choice xmlns:a14="http://schemas.microsoft.com/office/drawing/2010/main" Requires="a14">
+      <mc:AlternateContent xmlns:mc="http://schemas.openxmlformats.org/markup-compatibility/2006" xmlns:a14="http://schemas.microsoft.com/office/drawing/2010/main">
+        <mc:Choice Requires="a14">
           <p:sp>
             <p:nvSpPr>
               <p:cNvPr id="5" name="Rectangle 4">
@@ -3549,7 +3554,7 @@
             </p:txBody>
           </p:sp>
         </mc:Choice>
-        <mc:Fallback>
+        <mc:Fallback xmlns="">
           <p:sp>
             <p:nvSpPr>
               <p:cNvPr id="5" name="Rectangle 4">
@@ -3629,8 +3634,8 @@
           </a:p>
         </p:txBody>
       </p:sp>
-      <mc:AlternateContent xmlns:mc="http://schemas.openxmlformats.org/markup-compatibility/2006">
-        <mc:Choice xmlns:a14="http://schemas.microsoft.com/office/drawing/2010/main" Requires="a14">
+      <mc:AlternateContent xmlns:mc="http://schemas.openxmlformats.org/markup-compatibility/2006" xmlns:a14="http://schemas.microsoft.com/office/drawing/2010/main">
+        <mc:Choice Requires="a14">
           <p:sp>
             <p:nvSpPr>
               <p:cNvPr id="7" name="Rectangle: Rounded Corners 6">
@@ -3716,7 +3721,7 @@
             </p:txBody>
           </p:sp>
         </mc:Choice>
-        <mc:Fallback>
+        <mc:Fallback xmlns="">
           <p:sp>
             <p:nvSpPr>
               <p:cNvPr id="7" name="Rectangle: Rounded Corners 6">
@@ -3813,511 +3818,8 @@
           </a:p>
         </p:txBody>
       </p:sp>
-      <p:cxnSp>
-        <p:nvCxnSpPr>
-          <p:cNvPr id="11" name="Connector: Elbow 10">
-            <a:extLst>
-              <a:ext uri="{FF2B5EF4-FFF2-40B4-BE49-F238E27FC236}">
-                <a16:creationId xmlns:a16="http://schemas.microsoft.com/office/drawing/2014/main" id="{6AD39FF8-2C52-432C-95B6-7C16609B7AB2}"/>
-              </a:ext>
-            </a:extLst>
-          </p:cNvPr>
-          <p:cNvCxnSpPr>
-            <a:cxnSpLocks/>
-            <a:stCxn id="7" idx="2"/>
-            <a:endCxn id="12" idx="1"/>
-          </p:cNvCxnSpPr>
-          <p:nvPr/>
-        </p:nvCxnSpPr>
-        <p:spPr>
-          <a:xfrm rot="16200000" flipH="1">
-            <a:off x="2981512" y="1943375"/>
-            <a:ext cx="260226" cy="1850995"/>
-          </a:xfrm>
-          <a:prstGeom prst="bentConnector2">
-            <a:avLst/>
-          </a:prstGeom>
-          <a:ln>
-            <a:tailEnd type="triangle"/>
-          </a:ln>
-        </p:spPr>
-        <p:style>
-          <a:lnRef idx="1">
-            <a:schemeClr val="accent1"/>
-          </a:lnRef>
-          <a:fillRef idx="0">
-            <a:schemeClr val="accent1"/>
-          </a:fillRef>
-          <a:effectRef idx="0">
-            <a:schemeClr val="accent1"/>
-          </a:effectRef>
-          <a:fontRef idx="minor">
-            <a:schemeClr val="tx1"/>
-          </a:fontRef>
-        </p:style>
-      </p:cxnSp>
-      <mc:AlternateContent xmlns:mc="http://schemas.openxmlformats.org/markup-compatibility/2006">
-        <mc:Choice xmlns:a14="http://schemas.microsoft.com/office/drawing/2010/main" Requires="a14">
-          <p:sp>
-            <p:nvSpPr>
-              <p:cNvPr id="12" name="Rectangle 11">
-                <a:extLst>
-                  <a:ext uri="{FF2B5EF4-FFF2-40B4-BE49-F238E27FC236}">
-                    <a16:creationId xmlns:a16="http://schemas.microsoft.com/office/drawing/2014/main" id="{1FFE319C-5B50-44AA-998B-3E65C4C92DE8}"/>
-                  </a:ext>
-                </a:extLst>
-              </p:cNvPr>
-              <p:cNvSpPr/>
-              <p:nvPr/>
-            </p:nvSpPr>
-            <p:spPr>
-              <a:xfrm>
-                <a:off x="4037123" y="2587283"/>
-                <a:ext cx="2086251" cy="823406"/>
-              </a:xfrm>
-              <a:prstGeom prst="rect">
-                <a:avLst/>
-              </a:prstGeom>
-              <a:solidFill>
-                <a:schemeClr val="bg1"/>
-              </a:solidFill>
-              <a:ln>
-                <a:solidFill>
-                  <a:srgbClr val="FF0000"/>
-                </a:solidFill>
-              </a:ln>
-            </p:spPr>
-            <p:style>
-              <a:lnRef idx="2">
-                <a:schemeClr val="accent1">
-                  <a:shade val="50000"/>
-                </a:schemeClr>
-              </a:lnRef>
-              <a:fillRef idx="1">
-                <a:schemeClr val="accent1"/>
-              </a:fillRef>
-              <a:effectRef idx="0">
-                <a:schemeClr val="accent1"/>
-              </a:effectRef>
-              <a:fontRef idx="minor">
-                <a:schemeClr val="lt1"/>
-              </a:fontRef>
-            </p:style>
-            <p:txBody>
-              <a:bodyPr rtlCol="0" anchor="ctr"/>
-              <a:lstStyle/>
-              <a:p>
-                <a:pPr algn="ctr"/>
-                <a14:m>
-                  <m:oMath xmlns:m="http://schemas.openxmlformats.org/officeDocument/2006/math">
-                    <m:r>
-                      <a:rPr lang="en-IL" b="0" i="1" smtClean="0">
-                        <a:solidFill>
-                          <a:schemeClr val="tx1"/>
-                        </a:solidFill>
-                        <a:latin typeface="Cambria Math" panose="02040503050406030204" pitchFamily="18" charset="0"/>
-                      </a:rPr>
-                      <m:t>𝑃</m:t>
-                    </m:r>
-                    <m:r>
-                      <a:rPr lang="en-IL" b="0" i="1" smtClean="0">
-                        <a:solidFill>
-                          <a:schemeClr val="tx1"/>
-                        </a:solidFill>
-                        <a:latin typeface="Cambria Math" panose="02040503050406030204" pitchFamily="18" charset="0"/>
-                      </a:rPr>
-                      <m:t>∼</m:t>
-                    </m:r>
-                    <m:sSub>
-                      <m:sSubPr>
-                        <m:ctrlPr>
-                          <a:rPr lang="en-IL" i="1">
-                            <a:solidFill>
-                              <a:schemeClr val="tx1"/>
-                            </a:solidFill>
-                            <a:latin typeface="Cambria Math" panose="02040503050406030204" pitchFamily="18" charset="0"/>
-                          </a:rPr>
-                        </m:ctrlPr>
-                      </m:sSubPr>
-                      <m:e>
-                        <m:r>
-                          <a:rPr lang="en-IL" i="1">
-                            <a:solidFill>
-                              <a:schemeClr val="tx1"/>
-                            </a:solidFill>
-                            <a:latin typeface="Cambria Math" panose="02040503050406030204" pitchFamily="18" charset="0"/>
-                          </a:rPr>
-                          <m:t>𝒬</m:t>
-                        </m:r>
-                      </m:e>
-                      <m:sub>
-                        <m:r>
-                          <a:rPr lang="en-IL" i="1">
-                            <a:solidFill>
-                              <a:schemeClr val="tx1"/>
-                            </a:solidFill>
-                            <a:latin typeface="Cambria Math" panose="02040503050406030204" pitchFamily="18" charset="0"/>
-                          </a:rPr>
-                          <m:t>1:</m:t>
-                        </m:r>
-                        <m:r>
-                          <a:rPr lang="en-IL" i="1">
-                            <a:solidFill>
-                              <a:schemeClr val="tx1"/>
-                            </a:solidFill>
-                            <a:latin typeface="Cambria Math" panose="02040503050406030204" pitchFamily="18" charset="0"/>
-                          </a:rPr>
-                          <m:t>𝑁</m:t>
-                        </m:r>
-                      </m:sub>
-                    </m:sSub>
-                    <m:r>
-                      <a:rPr lang="en-IL" b="0" i="1" smtClean="0">
-                        <a:solidFill>
-                          <a:schemeClr val="tx1"/>
-                        </a:solidFill>
-                        <a:latin typeface="Cambria Math" panose="02040503050406030204" pitchFamily="18" charset="0"/>
-                      </a:rPr>
-                      <m:t>, </m:t>
-                    </m:r>
-                    <m:r>
-                      <a:rPr lang="en-IL" b="0" i="1" smtClean="0">
-                        <a:solidFill>
-                          <a:schemeClr val="tx1"/>
-                        </a:solidFill>
-                        <a:latin typeface="Cambria Math" panose="02040503050406030204" pitchFamily="18" charset="0"/>
-                      </a:rPr>
-                      <m:t>h</m:t>
-                    </m:r>
-                    <m:r>
-                      <a:rPr lang="en-IL" b="0" i="1" smtClean="0">
-                        <a:solidFill>
-                          <a:schemeClr val="tx1"/>
-                        </a:solidFill>
-                        <a:latin typeface="Cambria Math" panose="02040503050406030204" pitchFamily="18" charset="0"/>
-                      </a:rPr>
-                      <m:t>∼</m:t>
-                    </m:r>
-                    <m:r>
-                      <a:rPr lang="en-IL" b="0" i="1" smtClean="0">
-                        <a:solidFill>
-                          <a:schemeClr val="tx1"/>
-                        </a:solidFill>
-                        <a:latin typeface="Cambria Math" panose="02040503050406030204" pitchFamily="18" charset="0"/>
-                      </a:rPr>
-                      <m:t>𝑃</m:t>
-                    </m:r>
-                  </m:oMath>
-                </a14:m>
-                <a:r>
-                  <a:rPr lang="en-IL" dirty="0">
-                    <a:solidFill>
-                      <a:schemeClr val="tx1"/>
-                    </a:solidFill>
-                  </a:rPr>
-                  <a:t> </a:t>
-                </a:r>
-              </a:p>
-            </p:txBody>
-          </p:sp>
-        </mc:Choice>
-        <mc:Fallback>
-          <p:sp>
-            <p:nvSpPr>
-              <p:cNvPr id="12" name="Rectangle 11">
-                <a:extLst>
-                  <a:ext uri="{FF2B5EF4-FFF2-40B4-BE49-F238E27FC236}">
-                    <a16:creationId xmlns:a16="http://schemas.microsoft.com/office/drawing/2014/main" id="{1FFE319C-5B50-44AA-998B-3E65C4C92DE8}"/>
-                  </a:ext>
-                </a:extLst>
-              </p:cNvPr>
-              <p:cNvSpPr>
-                <a:spLocks noRot="1" noChangeAspect="1" noMove="1" noResize="1" noEditPoints="1" noAdjustHandles="1" noChangeArrowheads="1" noChangeShapeType="1" noTextEdit="1"/>
-              </p:cNvSpPr>
-              <p:nvPr/>
-            </p:nvSpPr>
-            <p:spPr>
-              <a:xfrm>
-                <a:off x="4037123" y="2587283"/>
-                <a:ext cx="2086251" cy="823406"/>
-              </a:xfrm>
-              <a:prstGeom prst="rect">
-                <a:avLst/>
-              </a:prstGeom>
-              <a:blipFill>
-                <a:blip r:embed="rId5"/>
-                <a:stretch>
-                  <a:fillRect/>
-                </a:stretch>
-              </a:blipFill>
-              <a:ln>
-                <a:solidFill>
-                  <a:srgbClr val="FF0000"/>
-                </a:solidFill>
-              </a:ln>
-            </p:spPr>
-            <p:txBody>
-              <a:bodyPr/>
-              <a:lstStyle/>
-              <a:p>
-                <a:r>
-                  <a:rPr lang="en-IL">
-                    <a:noFill/>
-                  </a:rPr>
-                  <a:t> </a:t>
-                </a:r>
-              </a:p>
-            </p:txBody>
-          </p:sp>
-        </mc:Fallback>
-      </mc:AlternateContent>
-      <mc:AlternateContent xmlns:mc="http://schemas.openxmlformats.org/markup-compatibility/2006">
-        <mc:Choice xmlns:a14="http://schemas.microsoft.com/office/drawing/2010/main" Requires="a14">
-          <p:sp>
-            <p:nvSpPr>
-              <p:cNvPr id="16" name="TextBox 15">
-                <a:extLst>
-                  <a:ext uri="{FF2B5EF4-FFF2-40B4-BE49-F238E27FC236}">
-                    <a16:creationId xmlns:a16="http://schemas.microsoft.com/office/drawing/2014/main" id="{10B9E8CB-AA1F-4E36-A7B8-6E456D86134B}"/>
-                  </a:ext>
-                </a:extLst>
-              </p:cNvPr>
-              <p:cNvSpPr txBox="1"/>
-              <p:nvPr/>
-            </p:nvSpPr>
-            <p:spPr>
-              <a:xfrm>
-                <a:off x="7139866" y="2810601"/>
-                <a:ext cx="1961965" cy="376770"/>
-              </a:xfrm>
-              <a:prstGeom prst="rect">
-                <a:avLst/>
-              </a:prstGeom>
-              <a:noFill/>
-              <a:ln>
-                <a:solidFill>
-                  <a:schemeClr val="tx1"/>
-                </a:solidFill>
-              </a:ln>
-            </p:spPr>
-            <p:txBody>
-              <a:bodyPr wrap="square" rtlCol="0">
-                <a:spAutoFit/>
-              </a:bodyPr>
-              <a:lstStyle/>
-              <a:p>
-                <a14:m>
-                  <m:oMathPara xmlns:m="http://schemas.openxmlformats.org/officeDocument/2006/math">
-                    <m:oMathParaPr>
-                      <m:jc m:val="centerGroup"/>
-                    </m:oMathParaPr>
-                    <m:oMath xmlns:m="http://schemas.openxmlformats.org/officeDocument/2006/math">
-                      <m:acc>
-                        <m:accPr>
-                          <m:chr m:val="̂"/>
-                          <m:ctrlPr>
-                            <a:rPr lang="en-IL" i="1" smtClean="0">
-                              <a:latin typeface="Cambria Math" panose="02040503050406030204" pitchFamily="18" charset="0"/>
-                            </a:rPr>
-                          </m:ctrlPr>
-                        </m:accPr>
-                        <m:e>
-                          <m:r>
-                            <a:rPr lang="en-IL" b="0" i="1" smtClean="0">
-                              <a:latin typeface="Cambria Math" panose="02040503050406030204" pitchFamily="18" charset="0"/>
-                            </a:rPr>
-                            <m:t>𝐿</m:t>
-                          </m:r>
-                        </m:e>
-                      </m:acc>
-                      <m:d>
-                        <m:dPr>
-                          <m:ctrlPr>
-                            <a:rPr lang="en-IL" b="0" i="1" smtClean="0">
-                              <a:latin typeface="Cambria Math" panose="02040503050406030204" pitchFamily="18" charset="0"/>
-                            </a:rPr>
-                          </m:ctrlPr>
-                        </m:dPr>
-                        <m:e>
-                          <m:r>
-                            <a:rPr lang="en-IL" b="0" i="1" smtClean="0">
-                              <a:latin typeface="Cambria Math" panose="02040503050406030204" pitchFamily="18" charset="0"/>
-                            </a:rPr>
-                            <m:t>h</m:t>
-                          </m:r>
-                          <m:r>
-                            <a:rPr lang="en-IL" b="0" i="1" smtClean="0">
-                              <a:latin typeface="Cambria Math" panose="02040503050406030204" pitchFamily="18" charset="0"/>
-                            </a:rPr>
-                            <m:t>, </m:t>
-                          </m:r>
-                          <m:sSub>
-                            <m:sSubPr>
-                              <m:ctrlPr>
-                                <a:rPr lang="en-IL" b="0" i="1" smtClean="0">
-                                  <a:latin typeface="Cambria Math" panose="02040503050406030204" pitchFamily="18" charset="0"/>
-                                </a:rPr>
-                              </m:ctrlPr>
-                            </m:sSubPr>
-                            <m:e>
-                              <m:r>
-                                <a:rPr lang="en-IL" b="0" i="1" smtClean="0">
-                                  <a:latin typeface="Cambria Math" panose="02040503050406030204" pitchFamily="18" charset="0"/>
-                                </a:rPr>
-                                <m:t>𝑆</m:t>
-                              </m:r>
-                            </m:e>
-                            <m:sub>
-                              <m:r>
-                                <a:rPr lang="en-IL" b="0" i="1" smtClean="0">
-                                  <a:latin typeface="Cambria Math" panose="02040503050406030204" pitchFamily="18" charset="0"/>
-                                </a:rPr>
-                                <m:t>𝑇</m:t>
-                              </m:r>
-                            </m:sub>
-                          </m:sSub>
-                        </m:e>
-                      </m:d>
-                      <m:r>
-                        <a:rPr lang="en-IL" i="1">
-                          <a:latin typeface="Cambria Math" panose="02040503050406030204" pitchFamily="18" charset="0"/>
-                          <a:ea typeface="Cambria Math" panose="02040503050406030204" pitchFamily="18" charset="0"/>
-                        </a:rPr>
-                        <m:t>≜</m:t>
-                      </m:r>
-                      <m:sSub>
-                        <m:sSubPr>
-                          <m:ctrlPr>
-                            <a:rPr lang="en-IL" b="0" i="1" smtClean="0">
-                              <a:latin typeface="Cambria Math" panose="02040503050406030204" pitchFamily="18" charset="0"/>
-                              <a:ea typeface="Cambria Math" panose="02040503050406030204" pitchFamily="18" charset="0"/>
-                            </a:rPr>
-                          </m:ctrlPr>
-                        </m:sSubPr>
-                        <m:e>
-                          <m:r>
-                            <a:rPr lang="en-IL" b="0" i="1" smtClean="0">
-                              <a:latin typeface="Cambria Math" panose="02040503050406030204" pitchFamily="18" charset="0"/>
-                              <a:ea typeface="Cambria Math" panose="02040503050406030204" pitchFamily="18" charset="0"/>
-                            </a:rPr>
-                            <m:t>𝐿</m:t>
-                          </m:r>
-                        </m:e>
-                        <m:sub>
-                          <m:r>
-                            <a:rPr lang="en-IL" b="0" i="1" smtClean="0">
-                              <a:latin typeface="Cambria Math" panose="02040503050406030204" pitchFamily="18" charset="0"/>
-                              <a:ea typeface="Cambria Math" panose="02040503050406030204" pitchFamily="18" charset="0"/>
-                            </a:rPr>
-                            <m:t>𝑏𝑎𝑠𝑒</m:t>
-                          </m:r>
-                        </m:sub>
-                      </m:sSub>
-                    </m:oMath>
-                  </m:oMathPara>
-                </a14:m>
-                <a:endParaRPr lang="en-IL" dirty="0"/>
-              </a:p>
-            </p:txBody>
-          </p:sp>
-        </mc:Choice>
-        <mc:Fallback>
-          <p:sp>
-            <p:nvSpPr>
-              <p:cNvPr id="16" name="TextBox 15">
-                <a:extLst>
-                  <a:ext uri="{FF2B5EF4-FFF2-40B4-BE49-F238E27FC236}">
-                    <a16:creationId xmlns:a16="http://schemas.microsoft.com/office/drawing/2014/main" id="{10B9E8CB-AA1F-4E36-A7B8-6E456D86134B}"/>
-                  </a:ext>
-                </a:extLst>
-              </p:cNvPr>
-              <p:cNvSpPr txBox="1">
-                <a:spLocks noRot="1" noChangeAspect="1" noMove="1" noResize="1" noEditPoints="1" noAdjustHandles="1" noChangeArrowheads="1" noChangeShapeType="1" noTextEdit="1"/>
-              </p:cNvSpPr>
-              <p:nvPr/>
-            </p:nvSpPr>
-            <p:spPr>
-              <a:xfrm>
-                <a:off x="7139866" y="2810601"/>
-                <a:ext cx="1961965" cy="376770"/>
-              </a:xfrm>
-              <a:prstGeom prst="rect">
-                <a:avLst/>
-              </a:prstGeom>
-              <a:blipFill>
-                <a:blip r:embed="rId6"/>
-                <a:stretch>
-                  <a:fillRect/>
-                </a:stretch>
-              </a:blipFill>
-              <a:ln>
-                <a:solidFill>
-                  <a:schemeClr val="tx1"/>
-                </a:solidFill>
-              </a:ln>
-            </p:spPr>
-            <p:txBody>
-              <a:bodyPr/>
-              <a:lstStyle/>
-              <a:p>
-                <a:r>
-                  <a:rPr lang="en-IL">
-                    <a:noFill/>
-                  </a:rPr>
-                  <a:t> </a:t>
-                </a:r>
-              </a:p>
-            </p:txBody>
-          </p:sp>
-        </mc:Fallback>
-      </mc:AlternateContent>
-      <p:cxnSp>
-        <p:nvCxnSpPr>
-          <p:cNvPr id="20" name="Straight Arrow Connector 19">
-            <a:extLst>
-              <a:ext uri="{FF2B5EF4-FFF2-40B4-BE49-F238E27FC236}">
-                <a16:creationId xmlns:a16="http://schemas.microsoft.com/office/drawing/2014/main" id="{9322547F-F2C6-49B4-B69B-C1FE2B6EA396}"/>
-              </a:ext>
-            </a:extLst>
-          </p:cNvPr>
-          <p:cNvCxnSpPr>
-            <a:stCxn id="12" idx="3"/>
-            <a:endCxn id="16" idx="1"/>
-          </p:cNvCxnSpPr>
-          <p:nvPr/>
-        </p:nvCxnSpPr>
-        <p:spPr>
-          <a:xfrm>
-            <a:off x="6123374" y="2998986"/>
-            <a:ext cx="1016492" cy="0"/>
-          </a:xfrm>
-          <a:prstGeom prst="straightConnector1">
-            <a:avLst/>
-          </a:prstGeom>
-          <a:ln>
-            <a:solidFill>
-              <a:srgbClr val="FF0000"/>
-            </a:solidFill>
-            <a:tailEnd type="triangle"/>
-          </a:ln>
-        </p:spPr>
-        <p:style>
-          <a:lnRef idx="1">
-            <a:schemeClr val="accent1"/>
-          </a:lnRef>
-          <a:fillRef idx="0">
-            <a:schemeClr val="accent1"/>
-          </a:fillRef>
-          <a:effectRef idx="0">
-            <a:schemeClr val="accent1"/>
-          </a:effectRef>
-          <a:fontRef idx="minor">
-            <a:schemeClr val="tx1"/>
-          </a:fontRef>
-        </p:style>
-      </p:cxnSp>
-      <mc:AlternateContent xmlns:mc="http://schemas.openxmlformats.org/markup-compatibility/2006">
-        <mc:Choice xmlns:a14="http://schemas.microsoft.com/office/drawing/2010/main" Requires="a14">
+      <mc:AlternateContent xmlns:mc="http://schemas.openxmlformats.org/markup-compatibility/2006" xmlns:a14="http://schemas.microsoft.com/office/drawing/2010/main">
+        <mc:Choice Requires="a14">
           <p:sp>
             <p:nvSpPr>
               <p:cNvPr id="22" name="Rectangle 21">
@@ -4332,7 +3834,7 @@
             </p:nvSpPr>
             <p:spPr>
               <a:xfrm>
-                <a:off x="4021584" y="3577703"/>
+                <a:off x="3817397" y="3136312"/>
                 <a:ext cx="2672179" cy="823406"/>
               </a:xfrm>
               <a:prstGeom prst="rect">
@@ -4594,7 +4096,7 @@
             </p:txBody>
           </p:sp>
         </mc:Choice>
-        <mc:Fallback>
+        <mc:Fallback xmlns="">
           <p:sp>
             <p:nvSpPr>
               <p:cNvPr id="22" name="Rectangle 21">
@@ -4611,14 +4113,14 @@
             </p:nvSpPr>
             <p:spPr>
               <a:xfrm>
-                <a:off x="4021584" y="3577703"/>
+                <a:off x="3817397" y="3136312"/>
                 <a:ext cx="2672179" cy="823406"/>
               </a:xfrm>
               <a:prstGeom prst="rect">
                 <a:avLst/>
               </a:prstGeom>
               <a:blipFill>
-                <a:blip r:embed="rId7"/>
+                <a:blip r:embed="rId5"/>
                 <a:stretch>
                   <a:fillRect/>
                 </a:stretch>
@@ -4662,8 +4164,8 @@
         </p:nvCxnSpPr>
         <p:spPr>
           <a:xfrm rot="16200000" flipH="1">
-            <a:off x="2478533" y="2446355"/>
-            <a:ext cx="1250646" cy="1835456"/>
+            <a:off x="2597135" y="2327752"/>
+            <a:ext cx="809255" cy="1631269"/>
           </a:xfrm>
           <a:prstGeom prst="bentConnector2">
             <a:avLst/>
@@ -4703,7 +4205,7 @@
             </p:nvSpPr>
             <p:spPr>
               <a:xfrm>
-                <a:off x="4600855" y="4602514"/>
+                <a:off x="4304561" y="4261005"/>
                 <a:ext cx="406152" cy="426684"/>
               </a:xfrm>
               <a:prstGeom prst="rect">
@@ -4785,16 +4287,16 @@
             </p:nvSpPr>
             <p:spPr>
               <a:xfrm>
-                <a:off x="4600855" y="4602514"/>
+                <a:off x="4304561" y="4261005"/>
                 <a:ext cx="406152" cy="426684"/>
               </a:xfrm>
               <a:prstGeom prst="rect">
                 <a:avLst/>
               </a:prstGeom>
               <a:blipFill>
-                <a:blip r:embed="rId8"/>
+                <a:blip r:embed="rId6"/>
                 <a:stretch>
-                  <a:fillRect l="-5882"/>
+                  <a:fillRect l="-4348"/>
                 </a:stretch>
               </a:blipFill>
             </p:spPr>
@@ -4831,8 +4333,8 @@
         </p:nvCxnSpPr>
         <p:spPr>
           <a:xfrm flipV="1">
-            <a:off x="5007007" y="4401109"/>
-            <a:ext cx="350667" cy="414747"/>
+            <a:off x="4710713" y="3959718"/>
+            <a:ext cx="442774" cy="514629"/>
           </a:xfrm>
           <a:prstGeom prst="bentConnector2">
             <a:avLst/>
@@ -4859,46 +4361,140 @@
           </a:fontRef>
         </p:style>
       </p:cxnSp>
-      <p:sp>
-        <p:nvSpPr>
-          <p:cNvPr id="33" name="TextBox 32">
-            <a:extLst>
-              <a:ext uri="{FF2B5EF4-FFF2-40B4-BE49-F238E27FC236}">
-                <a16:creationId xmlns:a16="http://schemas.microsoft.com/office/drawing/2014/main" id="{2ED285B6-1F9C-4478-B894-C97826BB8E95}"/>
-              </a:ext>
-            </a:extLst>
-          </p:cNvPr>
-          <p:cNvSpPr txBox="1"/>
-          <p:nvPr/>
-        </p:nvSpPr>
-        <p:spPr>
-          <a:xfrm>
-            <a:off x="7139866" y="3804740"/>
-            <a:ext cx="3389789" cy="369332"/>
-          </a:xfrm>
-          <a:prstGeom prst="rect">
-            <a:avLst/>
-          </a:prstGeom>
-          <a:noFill/>
-          <a:ln>
-            <a:solidFill>
-              <a:schemeClr val="tx1"/>
-            </a:solidFill>
-          </a:ln>
-        </p:spPr>
-        <p:txBody>
-          <a:bodyPr wrap="square" rtlCol="0">
-            <a:spAutoFit/>
-          </a:bodyPr>
-          <a:lstStyle/>
-          <a:p>
-            <a:r>
-              <a:rPr lang="en-IL" dirty="0"/>
-              <a:t>Standard Meta-Learning bounds</a:t>
-            </a:r>
-          </a:p>
-        </p:txBody>
-      </p:sp>
+      <mc:AlternateContent xmlns:mc="http://schemas.openxmlformats.org/markup-compatibility/2006" xmlns:a14="http://schemas.microsoft.com/office/drawing/2010/main">
+        <mc:Choice Requires="a14">
+          <p:sp>
+            <p:nvSpPr>
+              <p:cNvPr id="33" name="TextBox 32">
+                <a:extLst>
+                  <a:ext uri="{FF2B5EF4-FFF2-40B4-BE49-F238E27FC236}">
+                    <a16:creationId xmlns:a16="http://schemas.microsoft.com/office/drawing/2014/main" id="{2ED285B6-1F9C-4478-B894-C97826BB8E95}"/>
+                  </a:ext>
+                </a:extLst>
+              </p:cNvPr>
+              <p:cNvSpPr txBox="1"/>
+              <p:nvPr/>
+            </p:nvSpPr>
+            <p:spPr>
+              <a:xfrm>
+                <a:off x="7139866" y="3363348"/>
+                <a:ext cx="3674615" cy="378758"/>
+              </a:xfrm>
+              <a:prstGeom prst="rect">
+                <a:avLst/>
+              </a:prstGeom>
+              <a:noFill/>
+              <a:ln>
+                <a:solidFill>
+                  <a:schemeClr val="tx1"/>
+                </a:solidFill>
+              </a:ln>
+            </p:spPr>
+            <p:txBody>
+              <a:bodyPr wrap="square" rtlCol="0">
+                <a:spAutoFit/>
+              </a:bodyPr>
+              <a:lstStyle/>
+              <a:p>
+                <a14:m>
+                  <m:oMath xmlns:m="http://schemas.openxmlformats.org/officeDocument/2006/math">
+                    <m:sSub>
+                      <m:sSubPr>
+                        <m:ctrlPr>
+                          <a:rPr lang="en-IL" b="0" i="1" dirty="0" smtClean="0">
+                            <a:latin typeface="Cambria Math" panose="02040503050406030204" pitchFamily="18" charset="0"/>
+                          </a:rPr>
+                        </m:ctrlPr>
+                      </m:sSubPr>
+                      <m:e>
+                        <m:acc>
+                          <m:accPr>
+                            <m:chr m:val="̂"/>
+                            <m:ctrlPr>
+                              <a:rPr lang="en-IL" b="0" i="1" dirty="0" smtClean="0">
+                                <a:latin typeface="Cambria Math" panose="02040503050406030204" pitchFamily="18" charset="0"/>
+                              </a:rPr>
+                            </m:ctrlPr>
+                          </m:accPr>
+                          <m:e>
+                            <m:r>
+                              <a:rPr lang="en-IL" i="1" dirty="0">
+                                <a:latin typeface="Cambria Math" panose="02040503050406030204" pitchFamily="18" charset="0"/>
+                              </a:rPr>
+                              <m:t>ℒ</m:t>
+                            </m:r>
+                          </m:e>
+                        </m:acc>
+                      </m:e>
+                      <m:sub>
+                        <m:r>
+                          <a:rPr lang="en-IL" b="0" i="1" dirty="0" smtClean="0">
+                            <a:latin typeface="Cambria Math" panose="02040503050406030204" pitchFamily="18" charset="0"/>
+                          </a:rPr>
+                          <m:t>𝑚𝑙</m:t>
+                        </m:r>
+                      </m:sub>
+                    </m:sSub>
+                  </m:oMath>
+                </a14:m>
+                <a:r>
+                  <a:rPr lang="en-IL" dirty="0"/>
+                  <a:t> - standard meta-learning bound</a:t>
+                </a:r>
+              </a:p>
+            </p:txBody>
+          </p:sp>
+        </mc:Choice>
+        <mc:Fallback xmlns="">
+          <p:sp>
+            <p:nvSpPr>
+              <p:cNvPr id="33" name="TextBox 32">
+                <a:extLst>
+                  <a:ext uri="{FF2B5EF4-FFF2-40B4-BE49-F238E27FC236}">
+                    <a16:creationId xmlns:a16="http://schemas.microsoft.com/office/drawing/2014/main" id="{2ED285B6-1F9C-4478-B894-C97826BB8E95}"/>
+                  </a:ext>
+                </a:extLst>
+              </p:cNvPr>
+              <p:cNvSpPr txBox="1">
+                <a:spLocks noRot="1" noChangeAspect="1" noMove="1" noResize="1" noEditPoints="1" noAdjustHandles="1" noChangeArrowheads="1" noChangeShapeType="1" noTextEdit="1"/>
+              </p:cNvSpPr>
+              <p:nvPr/>
+            </p:nvSpPr>
+            <p:spPr>
+              <a:xfrm>
+                <a:off x="7139866" y="3363348"/>
+                <a:ext cx="3674615" cy="378758"/>
+              </a:xfrm>
+              <a:prstGeom prst="rect">
+                <a:avLst/>
+              </a:prstGeom>
+              <a:blipFill>
+                <a:blip r:embed="rId7"/>
+                <a:stretch>
+                  <a:fillRect t="-6250" b="-23438"/>
+                </a:stretch>
+              </a:blipFill>
+              <a:ln>
+                <a:solidFill>
+                  <a:schemeClr val="tx1"/>
+                </a:solidFill>
+              </a:ln>
+            </p:spPr>
+            <p:txBody>
+              <a:bodyPr/>
+              <a:lstStyle/>
+              <a:p>
+                <a:r>
+                  <a:rPr lang="en-IL">
+                    <a:noFill/>
+                  </a:rPr>
+                  <a:t> </a:t>
+                </a:r>
+              </a:p>
+            </p:txBody>
+          </p:sp>
+        </mc:Fallback>
+      </mc:AlternateContent>
       <p:cxnSp>
         <p:nvCxnSpPr>
           <p:cNvPr id="35" name="Straight Arrow Connector 34">
@@ -4917,8 +4513,8 @@
         </p:nvCxnSpPr>
         <p:spPr>
           <a:xfrm>
-            <a:off x="6693763" y="3989406"/>
-            <a:ext cx="446103" cy="0"/>
+            <a:off x="6489576" y="3548015"/>
+            <a:ext cx="650290" cy="4712"/>
           </a:xfrm>
           <a:prstGeom prst="straightConnector1">
             <a:avLst/>
@@ -4945,8 +4541,8 @@
           </a:fontRef>
         </p:style>
       </p:cxnSp>
-      <mc:AlternateContent xmlns:mc="http://schemas.openxmlformats.org/markup-compatibility/2006">
-        <mc:Choice xmlns:a14="http://schemas.microsoft.com/office/drawing/2010/main" Requires="a14">
+      <mc:AlternateContent xmlns:mc="http://schemas.openxmlformats.org/markup-compatibility/2006" xmlns:a14="http://schemas.microsoft.com/office/drawing/2010/main">
+        <mc:Choice Requires="a14">
           <p:sp>
             <p:nvSpPr>
               <p:cNvPr id="43" name="Rectangle: Rounded Corners 42">
@@ -5064,7 +4660,7 @@
             </p:txBody>
           </p:sp>
         </mc:Choice>
-        <mc:Fallback>
+        <mc:Fallback xmlns="">
           <p:sp>
             <p:nvSpPr>
               <p:cNvPr id="43" name="Rectangle: Rounded Corners 42">
@@ -5132,7 +4728,7 @@
           </a:xfrm>
           <a:prstGeom prst="bentConnector4">
             <a:avLst>
-              <a:gd name="adj1" fmla="val -28271"/>
+              <a:gd name="adj1" fmla="val -16195"/>
               <a:gd name="adj2" fmla="val 91090"/>
             </a:avLst>
           </a:prstGeom>
@@ -5155,8 +4751,8 @@
           </a:fontRef>
         </p:style>
       </p:cxnSp>
-      <mc:AlternateContent xmlns:mc="http://schemas.openxmlformats.org/markup-compatibility/2006">
-        <mc:Choice xmlns:a14="http://schemas.microsoft.com/office/drawing/2010/main" Requires="a14">
+      <mc:AlternateContent xmlns:mc="http://schemas.openxmlformats.org/markup-compatibility/2006" xmlns:a14="http://schemas.microsoft.com/office/drawing/2010/main">
+        <mc:Choice Requires="a14">
           <p:sp>
             <p:nvSpPr>
               <p:cNvPr id="56" name="Rectangle 55">
@@ -5171,7 +4767,7 @@
             </p:nvSpPr>
             <p:spPr>
               <a:xfrm>
-                <a:off x="4021584" y="5179011"/>
+                <a:off x="3725106" y="5176515"/>
                 <a:ext cx="2856760" cy="823406"/>
               </a:xfrm>
               <a:prstGeom prst="rect">
@@ -5476,7 +5072,7 @@
             </p:txBody>
           </p:sp>
         </mc:Choice>
-        <mc:Fallback>
+        <mc:Fallback xmlns="">
           <p:sp>
             <p:nvSpPr>
               <p:cNvPr id="56" name="Rectangle 55">
@@ -5493,7 +5089,7 @@
             </p:nvSpPr>
             <p:spPr>
               <a:xfrm>
-                <a:off x="4021584" y="5179011"/>
+                <a:off x="3725106" y="5176515"/>
                 <a:ext cx="2856760" cy="823406"/>
               </a:xfrm>
               <a:prstGeom prst="rect">
@@ -5543,7 +5139,7 @@
             <p:spPr>
               <a:xfrm>
                 <a:off x="7139866" y="5394923"/>
-                <a:ext cx="3389789" cy="391582"/>
+                <a:ext cx="3674615" cy="378758"/>
               </a:xfrm>
               <a:prstGeom prst="rect">
                 <a:avLst/>
@@ -5566,28 +5162,43 @@
                     <m:sSub>
                       <m:sSubPr>
                         <m:ctrlPr>
-                          <a:rPr lang="en-IL" b="0" i="1" smtClean="0">
+                          <a:rPr lang="en-IL" i="1" dirty="0" smtClean="0">
                             <a:latin typeface="Cambria Math" panose="02040503050406030204" pitchFamily="18" charset="0"/>
-                            <a:ea typeface="Cambria Math" panose="02040503050406030204" pitchFamily="18" charset="0"/>
                           </a:rPr>
                         </m:ctrlPr>
                       </m:sSubPr>
                       <m:e>
-                        <m:r>
-                          <a:rPr lang="en-IL" b="0" i="1" smtClean="0">
-                            <a:latin typeface="Cambria Math" panose="02040503050406030204" pitchFamily="18" charset="0"/>
-                            <a:ea typeface="Cambria Math" panose="02040503050406030204" pitchFamily="18" charset="0"/>
-                          </a:rPr>
-                          <m:t>𝐿</m:t>
-                        </m:r>
+                        <m:acc>
+                          <m:accPr>
+                            <m:chr m:val="̂"/>
+                            <m:ctrlPr>
+                              <a:rPr lang="en-IL" i="1" dirty="0">
+                                <a:latin typeface="Cambria Math" panose="02040503050406030204" pitchFamily="18" charset="0"/>
+                              </a:rPr>
+                            </m:ctrlPr>
+                          </m:accPr>
+                          <m:e>
+                            <m:r>
+                              <a:rPr lang="en-IL" i="1" dirty="0">
+                                <a:latin typeface="Cambria Math" panose="02040503050406030204" pitchFamily="18" charset="0"/>
+                              </a:rPr>
+                              <m:t>ℒ</m:t>
+                            </m:r>
+                          </m:e>
+                        </m:acc>
                       </m:e>
                       <m:sub>
                         <m:r>
-                          <a:rPr lang="en-IL" b="0" i="1" smtClean="0">
+                          <a:rPr lang="en-IL" b="0" i="1" dirty="0" smtClean="0">
                             <a:latin typeface="Cambria Math" panose="02040503050406030204" pitchFamily="18" charset="0"/>
-                            <a:ea typeface="Cambria Math" panose="02040503050406030204" pitchFamily="18" charset="0"/>
                           </a:rPr>
-                          <m:t>𝑓𝑢𝑙𝑙</m:t>
+                          <m:t>𝑎</m:t>
+                        </m:r>
+                        <m:r>
+                          <a:rPr lang="en-IL" i="1" dirty="0">
+                            <a:latin typeface="Cambria Math" panose="02040503050406030204" pitchFamily="18" charset="0"/>
+                          </a:rPr>
+                          <m:t>𝑚𝑙</m:t>
                         </m:r>
                       </m:sub>
                     </m:sSub>
@@ -5595,7 +5206,7 @@
                 </a14:m>
                 <a:r>
                   <a:rPr lang="en-IL" dirty="0"/>
-                  <a:t>, Data-dependant bound</a:t>
+                  <a:t> - Adaptive meta-learning</a:t>
                 </a:r>
               </a:p>
             </p:txBody>
@@ -5619,7 +5230,7 @@
             <p:spPr>
               <a:xfrm>
                 <a:off x="7139866" y="5394923"/>
-                <a:ext cx="3389789" cy="391582"/>
+                <a:ext cx="3674615" cy="378758"/>
               </a:xfrm>
               <a:prstGeom prst="rect">
                 <a:avLst/>
@@ -5627,7 +5238,7 @@
               <a:blipFill>
                 <a:blip r:embed="rId11"/>
                 <a:stretch>
-                  <a:fillRect t="-6061" b="-18182"/>
+                  <a:fillRect t="-6250" b="-23438"/>
                 </a:stretch>
               </a:blipFill>
               <a:ln>
@@ -5661,15 +5272,16 @@
             </a:extLst>
           </p:cNvPr>
           <p:cNvCxnSpPr>
+            <a:cxnSpLocks/>
             <a:stCxn id="56" idx="3"/>
             <a:endCxn id="57" idx="1"/>
           </p:cNvCxnSpPr>
           <p:nvPr/>
         </p:nvCxnSpPr>
         <p:spPr>
-          <a:xfrm>
-            <a:off x="6878344" y="5590714"/>
-            <a:ext cx="261522" cy="0"/>
+          <a:xfrm flipV="1">
+            <a:off x="6581866" y="5584302"/>
+            <a:ext cx="558000" cy="3916"/>
           </a:xfrm>
           <a:prstGeom prst="straightConnector1">
             <a:avLst/>
@@ -5712,9 +5324,9 @@
           <p:nvPr/>
         </p:nvCxnSpPr>
         <p:spPr>
-          <a:xfrm>
-            <a:off x="2994735" y="5590714"/>
-            <a:ext cx="1026849" cy="0"/>
+          <a:xfrm flipV="1">
+            <a:off x="2994735" y="5588218"/>
+            <a:ext cx="730371" cy="2496"/>
           </a:xfrm>
           <a:prstGeom prst="straightConnector1">
             <a:avLst/>
@@ -5756,8 +5368,8 @@
         </p:nvCxnSpPr>
         <p:spPr>
           <a:xfrm>
-            <a:off x="5007007" y="4815856"/>
-            <a:ext cx="442957" cy="363155"/>
+            <a:off x="4710713" y="4474347"/>
+            <a:ext cx="442773" cy="702168"/>
           </a:xfrm>
           <a:prstGeom prst="bentConnector2">
             <a:avLst/>
@@ -5797,7 +5409,7 @@
             </p:nvSpPr>
             <p:spPr>
               <a:xfrm>
-                <a:off x="863725" y="4163629"/>
+                <a:off x="934746" y="4163628"/>
                 <a:ext cx="621437" cy="621437"/>
               </a:xfrm>
               <a:prstGeom prst="rect">
@@ -5885,7 +5497,7 @@
             </p:nvSpPr>
             <p:spPr>
               <a:xfrm>
-                <a:off x="863725" y="4163629"/>
+                <a:off x="934746" y="4163628"/>
                 <a:ext cx="621437" cy="621437"/>
               </a:xfrm>
               <a:prstGeom prst="rect">

</xml_diff>

<commit_message>
Updates to future work segment
</commit_message>
<xml_diff>
--- a/plots_for_papers.pptx
+++ b/plots_for_papers.pptx
@@ -261,7 +261,7 @@
           <a:p>
             <a:fld id="{F63EBC33-19C7-4A76-BC4C-95BEB4AA5ECD}" type="datetimeFigureOut">
               <a:rPr lang="en-IL" smtClean="0"/>
-              <a:t>26/05/2022</a:t>
+              <a:t>26/06/2022</a:t>
             </a:fld>
             <a:endParaRPr lang="en-IL"/>
           </a:p>
@@ -461,7 +461,7 @@
           <a:p>
             <a:fld id="{F63EBC33-19C7-4A76-BC4C-95BEB4AA5ECD}" type="datetimeFigureOut">
               <a:rPr lang="en-IL" smtClean="0"/>
-              <a:t>26/05/2022</a:t>
+              <a:t>26/06/2022</a:t>
             </a:fld>
             <a:endParaRPr lang="en-IL"/>
           </a:p>
@@ -671,7 +671,7 @@
           <a:p>
             <a:fld id="{F63EBC33-19C7-4A76-BC4C-95BEB4AA5ECD}" type="datetimeFigureOut">
               <a:rPr lang="en-IL" smtClean="0"/>
-              <a:t>26/05/2022</a:t>
+              <a:t>26/06/2022</a:t>
             </a:fld>
             <a:endParaRPr lang="en-IL"/>
           </a:p>
@@ -871,7 +871,7 @@
           <a:p>
             <a:fld id="{F63EBC33-19C7-4A76-BC4C-95BEB4AA5ECD}" type="datetimeFigureOut">
               <a:rPr lang="en-IL" smtClean="0"/>
-              <a:t>26/05/2022</a:t>
+              <a:t>26/06/2022</a:t>
             </a:fld>
             <a:endParaRPr lang="en-IL"/>
           </a:p>
@@ -1147,7 +1147,7 @@
           <a:p>
             <a:fld id="{F63EBC33-19C7-4A76-BC4C-95BEB4AA5ECD}" type="datetimeFigureOut">
               <a:rPr lang="en-IL" smtClean="0"/>
-              <a:t>26/05/2022</a:t>
+              <a:t>26/06/2022</a:t>
             </a:fld>
             <a:endParaRPr lang="en-IL"/>
           </a:p>
@@ -1415,7 +1415,7 @@
           <a:p>
             <a:fld id="{F63EBC33-19C7-4A76-BC4C-95BEB4AA5ECD}" type="datetimeFigureOut">
               <a:rPr lang="en-IL" smtClean="0"/>
-              <a:t>26/05/2022</a:t>
+              <a:t>26/06/2022</a:t>
             </a:fld>
             <a:endParaRPr lang="en-IL"/>
           </a:p>
@@ -1830,7 +1830,7 @@
           <a:p>
             <a:fld id="{F63EBC33-19C7-4A76-BC4C-95BEB4AA5ECD}" type="datetimeFigureOut">
               <a:rPr lang="en-IL" smtClean="0"/>
-              <a:t>26/05/2022</a:t>
+              <a:t>26/06/2022</a:t>
             </a:fld>
             <a:endParaRPr lang="en-IL"/>
           </a:p>
@@ -1972,7 +1972,7 @@
           <a:p>
             <a:fld id="{F63EBC33-19C7-4A76-BC4C-95BEB4AA5ECD}" type="datetimeFigureOut">
               <a:rPr lang="en-IL" smtClean="0"/>
-              <a:t>26/05/2022</a:t>
+              <a:t>26/06/2022</a:t>
             </a:fld>
             <a:endParaRPr lang="en-IL"/>
           </a:p>
@@ -2085,7 +2085,7 @@
           <a:p>
             <a:fld id="{F63EBC33-19C7-4A76-BC4C-95BEB4AA5ECD}" type="datetimeFigureOut">
               <a:rPr lang="en-IL" smtClean="0"/>
-              <a:t>26/05/2022</a:t>
+              <a:t>26/06/2022</a:t>
             </a:fld>
             <a:endParaRPr lang="en-IL"/>
           </a:p>
@@ -2398,7 +2398,7 @@
           <a:p>
             <a:fld id="{F63EBC33-19C7-4A76-BC4C-95BEB4AA5ECD}" type="datetimeFigureOut">
               <a:rPr lang="en-IL" smtClean="0"/>
-              <a:t>26/05/2022</a:t>
+              <a:t>26/06/2022</a:t>
             </a:fld>
             <a:endParaRPr lang="en-IL"/>
           </a:p>
@@ -2687,7 +2687,7 @@
           <a:p>
             <a:fld id="{F63EBC33-19C7-4A76-BC4C-95BEB4AA5ECD}" type="datetimeFigureOut">
               <a:rPr lang="en-IL" smtClean="0"/>
-              <a:t>26/05/2022</a:t>
+              <a:t>26/06/2022</a:t>
             </a:fld>
             <a:endParaRPr lang="en-IL"/>
           </a:p>
@@ -2930,7 +2930,7 @@
           <a:p>
             <a:fld id="{F63EBC33-19C7-4A76-BC4C-95BEB4AA5ECD}" type="datetimeFigureOut">
               <a:rPr lang="en-IL" smtClean="0"/>
-              <a:t>26/05/2022</a:t>
+              <a:t>26/06/2022</a:t>
             </a:fld>
             <a:endParaRPr lang="en-IL"/>
           </a:p>
@@ -4189,8 +4189,8 @@
           </a:fontRef>
         </p:style>
       </p:cxnSp>
-      <mc:AlternateContent xmlns:mc="http://schemas.openxmlformats.org/markup-compatibility/2006">
-        <mc:Choice xmlns:a14="http://schemas.microsoft.com/office/drawing/2010/main" Requires="a14">
+      <mc:AlternateContent xmlns:mc="http://schemas.openxmlformats.org/markup-compatibility/2006" xmlns:a14="http://schemas.microsoft.com/office/drawing/2010/main">
+        <mc:Choice Requires="a14">
           <p:sp>
             <p:nvSpPr>
               <p:cNvPr id="30" name="Rectangle 29">
@@ -4270,7 +4270,7 @@
             </p:txBody>
           </p:sp>
         </mc:Choice>
-        <mc:Fallback>
+        <mc:Fallback xmlns="">
           <p:sp>
             <p:nvSpPr>
               <p:cNvPr id="30" name="Rectangle 29">
@@ -4361,8 +4361,8 @@
           </a:fontRef>
         </p:style>
       </p:cxnSp>
-      <mc:AlternateContent xmlns:mc="http://schemas.openxmlformats.org/markup-compatibility/2006" xmlns:a14="http://schemas.microsoft.com/office/drawing/2010/main">
-        <mc:Choice Requires="a14">
+      <mc:AlternateContent xmlns:mc="http://schemas.openxmlformats.org/markup-compatibility/2006">
+        <mc:Choice xmlns:a14="http://schemas.microsoft.com/office/drawing/2010/main" Requires="a14">
           <p:sp>
             <p:nvSpPr>
               <p:cNvPr id="33" name="TextBox 32">
@@ -4378,7 +4378,7 @@
             <p:spPr>
               <a:xfrm>
                 <a:off x="7139866" y="3363348"/>
-                <a:ext cx="3674615" cy="378758"/>
+                <a:ext cx="3674615" cy="403059"/>
               </a:xfrm>
               <a:prstGeom prst="rect">
                 <a:avLst/>
@@ -4428,10 +4428,13 @@
                       </m:e>
                       <m:sub>
                         <m:r>
-                          <a:rPr lang="en-IL" b="0" i="1" dirty="0" smtClean="0">
+                          <m:rPr>
+                            <m:nor/>
+                          </m:rPr>
+                          <a:rPr lang="en-IL" b="0" i="0" dirty="0" smtClean="0">
                             <a:latin typeface="Cambria Math" panose="02040503050406030204" pitchFamily="18" charset="0"/>
                           </a:rPr>
-                          <m:t>𝑚𝑙</m:t>
+                          <m:t>ml</m:t>
                         </m:r>
                       </m:sub>
                     </m:sSub>
@@ -4445,7 +4448,7 @@
             </p:txBody>
           </p:sp>
         </mc:Choice>
-        <mc:Fallback xmlns="">
+        <mc:Fallback>
           <p:sp>
             <p:nvSpPr>
               <p:cNvPr id="33" name="TextBox 32">
@@ -4463,7 +4466,7 @@
             <p:spPr>
               <a:xfrm>
                 <a:off x="7139866" y="3363348"/>
-                <a:ext cx="3674615" cy="378758"/>
+                <a:ext cx="3674615" cy="403059"/>
               </a:xfrm>
               <a:prstGeom prst="rect">
                 <a:avLst/>
@@ -4471,7 +4474,7 @@
               <a:blipFill>
                 <a:blip r:embed="rId7"/>
                 <a:stretch>
-                  <a:fillRect t="-6250" b="-23438"/>
+                  <a:fillRect t="-4412" b="-17647"/>
                 </a:stretch>
               </a:blipFill>
               <a:ln>
@@ -4514,7 +4517,7 @@
         <p:spPr>
           <a:xfrm>
             <a:off x="6489576" y="3548015"/>
-            <a:ext cx="650290" cy="4712"/>
+            <a:ext cx="650290" cy="16863"/>
           </a:xfrm>
           <a:prstGeom prst="straightConnector1">
             <a:avLst/>
@@ -5139,7 +5142,7 @@
             <p:spPr>
               <a:xfrm>
                 <a:off x="7139866" y="5394923"/>
-                <a:ext cx="3674615" cy="378758"/>
+                <a:ext cx="3674615" cy="404854"/>
               </a:xfrm>
               <a:prstGeom prst="rect">
                 <a:avLst/>
@@ -5189,16 +5192,13 @@
                       </m:e>
                       <m:sub>
                         <m:r>
-                          <a:rPr lang="en-IL" b="0" i="1" dirty="0" smtClean="0">
+                          <m:rPr>
+                            <m:nor/>
+                          </m:rPr>
+                          <a:rPr lang="en-IL" b="0" i="0" dirty="0" smtClean="0">
                             <a:latin typeface="Cambria Math" panose="02040503050406030204" pitchFamily="18" charset="0"/>
                           </a:rPr>
-                          <m:t>𝑎</m:t>
-                        </m:r>
-                        <m:r>
-                          <a:rPr lang="en-IL" i="1" dirty="0">
-                            <a:latin typeface="Cambria Math" panose="02040503050406030204" pitchFamily="18" charset="0"/>
-                          </a:rPr>
-                          <m:t>𝑚𝑙</m:t>
+                          <m:t>aml</m:t>
                         </m:r>
                       </m:sub>
                     </m:sSub>
@@ -5230,7 +5230,7 @@
             <p:spPr>
               <a:xfrm>
                 <a:off x="7139866" y="5394923"/>
-                <a:ext cx="3674615" cy="378758"/>
+                <a:ext cx="3674615" cy="404854"/>
               </a:xfrm>
               <a:prstGeom prst="rect">
                 <a:avLst/>
@@ -5238,7 +5238,7 @@
               <a:blipFill>
                 <a:blip r:embed="rId11"/>
                 <a:stretch>
-                  <a:fillRect t="-6250" b="-23438"/>
+                  <a:fillRect t="-4412" b="-17647"/>
                 </a:stretch>
               </a:blipFill>
               <a:ln>
@@ -5279,9 +5279,9 @@
           <p:nvPr/>
         </p:nvCxnSpPr>
         <p:spPr>
-          <a:xfrm flipV="1">
-            <a:off x="6581866" y="5584302"/>
-            <a:ext cx="558000" cy="3916"/>
+          <a:xfrm>
+            <a:off x="6581866" y="5588218"/>
+            <a:ext cx="558000" cy="9132"/>
           </a:xfrm>
           <a:prstGeom prst="straightConnector1">
             <a:avLst/>
@@ -5393,8 +5393,8 @@
           </a:fontRef>
         </p:style>
       </p:cxnSp>
-      <mc:AlternateContent xmlns:mc="http://schemas.openxmlformats.org/markup-compatibility/2006">
-        <mc:Choice xmlns:a14="http://schemas.microsoft.com/office/drawing/2010/main" Requires="a14">
+      <mc:AlternateContent xmlns:mc="http://schemas.openxmlformats.org/markup-compatibility/2006" xmlns:a14="http://schemas.microsoft.com/office/drawing/2010/main">
+        <mc:Choice Requires="a14">
           <p:sp>
             <p:nvSpPr>
               <p:cNvPr id="82" name="Rectangle 81">
@@ -5480,7 +5480,7 @@
             </p:txBody>
           </p:sp>
         </mc:Choice>
-        <mc:Fallback>
+        <mc:Fallback xmlns="">
           <p:sp>
             <p:nvSpPr>
               <p:cNvPr id="82" name="Rectangle 81">

</xml_diff>